<commit_message>
Updated presentations and requirements xref.
</commit_message>
<xml_diff>
--- a/om_00_Final Checklist.pptx
+++ b/om_00_Final Checklist.pptx
@@ -5,16 +5,17 @@
     <p:sldMasterId id="2147483648" r:id="rId1"/>
   </p:sldMasterIdLst>
   <p:notesMasterIdLst>
-    <p:notesMasterId r:id="rId6"/>
+    <p:notesMasterId r:id="rId7"/>
   </p:notesMasterIdLst>
   <p:handoutMasterIdLst>
-    <p:handoutMasterId r:id="rId7"/>
+    <p:handoutMasterId r:id="rId8"/>
   </p:handoutMasterIdLst>
   <p:sldIdLst>
     <p:sldId id="256" r:id="rId2"/>
     <p:sldId id="257" r:id="rId3"/>
-    <p:sldId id="260" r:id="rId4"/>
-    <p:sldId id="259" r:id="rId5"/>
+    <p:sldId id="261" r:id="rId4"/>
+    <p:sldId id="260" r:id="rId5"/>
+    <p:sldId id="259" r:id="rId6"/>
   </p:sldIdLst>
   <p:sldSz cx="9144000" cy="6858000" type="screen4x3"/>
   <p:notesSz cx="6858000" cy="9144000"/>
@@ -1449,7 +1450,7 @@
               </a14:hiddenLine>
             </a:ext>
             <a:ext uri="{FAA26D3D-D897-4be2-8F04-BA451C77F1D7}">
-              <ma14:placeholderFlag xmlns="" xmlns:ma14="http://schemas.microsoft.com/office/mac/drawingml/2011/main" val="1"/>
+              <ma14:placeholderFlag xmlns:ma14="http://schemas.microsoft.com/office/mac/drawingml/2011/main" xmlns="" val="1"/>
             </a:ext>
           </a:extLst>
         </p:spPr>
@@ -1511,7 +1512,7 @@
               </a14:hiddenLine>
             </a:ext>
             <a:ext uri="{FAA26D3D-D897-4be2-8F04-BA451C77F1D7}">
-              <ma14:placeholderFlag xmlns="" xmlns:ma14="http://schemas.microsoft.com/office/mac/drawingml/2011/main" val="1"/>
+              <ma14:placeholderFlag xmlns:ma14="http://schemas.microsoft.com/office/mac/drawingml/2011/main" xmlns="" val="1"/>
             </a:ext>
           </a:extLst>
         </p:spPr>
@@ -2727,7 +2728,7 @@
           <a:p>
             <a:r>
               <a:rPr lang="en-US" dirty="0" smtClean="0"/>
-              <a:t>Deliverable Artifacts</a:t>
+              <a:t>Distribution Note</a:t>
             </a:r>
             <a:endParaRPr lang="en-US" dirty="0"/>
           </a:p>
@@ -2748,114 +2749,123 @@
           <a:bodyPr/>
           <a:lstStyle/>
           <a:p>
-            <a:pPr>
-              <a:buFont typeface="Wingdings" pitchFamily="2" charset="2"/>
-              <a:buChar char="q"/>
-            </a:pPr>
+            <a:r>
+              <a:rPr lang="en-US" sz="2400" dirty="0" smtClean="0"/>
+              <a:t>All source code, unit tests, documentation, procedures, </a:t>
+            </a:r>
+            <a:r>
+              <a:rPr lang="en-US" sz="2400" dirty="0" err="1" smtClean="0"/>
+              <a:t>ppt</a:t>
+            </a:r>
+            <a:r>
+              <a:rPr lang="en-US" sz="2400" dirty="0" smtClean="0"/>
+              <a:t>, videos, </a:t>
+            </a:r>
+            <a:r>
+              <a:rPr lang="en-US" sz="2400" dirty="0" err="1" smtClean="0"/>
+              <a:t>etc</a:t>
+            </a:r>
+            <a:r>
+              <a:rPr lang="en-US" sz="2400" dirty="0" smtClean="0"/>
+              <a:t> are publicly available on the OpenMash </a:t>
+            </a:r>
+            <a:r>
+              <a:rPr lang="en-US" sz="2400" dirty="0" err="1" smtClean="0"/>
+              <a:t>GitHub</a:t>
+            </a:r>
+            <a:r>
+              <a:rPr lang="en-US" sz="2400" dirty="0" smtClean="0"/>
+              <a:t> at </a:t>
+            </a:r>
+            <a:r>
+              <a:rPr lang="en-US" sz="2400" dirty="0">
+                <a:hlinkClick r:id="rId2"/>
+              </a:rPr>
+              <a:t>https://</a:t>
+            </a:r>
+            <a:r>
+              <a:rPr lang="en-US" sz="2400" dirty="0" smtClean="0">
+                <a:hlinkClick r:id="rId2"/>
+              </a:rPr>
+              <a:t>github.com/openmash</a:t>
+            </a:r>
+            <a:endParaRPr lang="en-US" sz="2400" dirty="0" smtClean="0"/>
+          </a:p>
+          <a:p>
+            <a:endParaRPr lang="en-US" sz="2400" dirty="0"/>
+          </a:p>
+          <a:p>
+            <a:r>
+              <a:rPr lang="en-US" sz="2400" dirty="0" smtClean="0"/>
+              <a:t>All of the Submission specific documentation items are in the OpenMash/</a:t>
+            </a:r>
+            <a:r>
+              <a:rPr lang="en-US" sz="2400" dirty="0" err="1" smtClean="0"/>
+              <a:t>openmash</a:t>
+            </a:r>
+            <a:r>
+              <a:rPr lang="en-US" sz="2400" dirty="0" smtClean="0"/>
+              <a:t> repository at</a:t>
+            </a:r>
+            <a:br>
+              <a:rPr lang="en-US" sz="2400" dirty="0" smtClean="0"/>
+            </a:br>
+            <a:r>
+              <a:rPr lang="en-US" sz="2400" dirty="0">
+                <a:hlinkClick r:id="rId3"/>
+              </a:rPr>
+              <a:t>https://</a:t>
+            </a:r>
+            <a:r>
+              <a:rPr lang="en-US" sz="2400" dirty="0" smtClean="0">
+                <a:hlinkClick r:id="rId3"/>
+              </a:rPr>
+              <a:t>github.com/openmash/openmash</a:t>
+            </a:r>
+            <a:endParaRPr lang="en-US" sz="2400" dirty="0" smtClean="0"/>
+          </a:p>
+          <a:p>
+            <a:endParaRPr lang="en-US" sz="2400" dirty="0"/>
+          </a:p>
+          <a:p>
+            <a:r>
+              <a:rPr lang="en-US" sz="2400" dirty="0" smtClean="0"/>
+              <a:t>When distributed via </a:t>
+            </a:r>
+            <a:r>
+              <a:rPr lang="en-US" sz="2400" dirty="0" err="1" smtClean="0"/>
+              <a:t>Git</a:t>
+            </a:r>
+            <a:r>
+              <a:rPr lang="en-US" sz="2400" dirty="0" smtClean="0"/>
+              <a:t> they are pushed down in the directory hierarchy at</a:t>
+            </a:r>
+            <a:br>
+              <a:rPr lang="en-US" sz="2400" dirty="0" smtClean="0"/>
+            </a:br>
+            <a:r>
+              <a:rPr lang="en-US" sz="2400" dirty="0" smtClean="0"/>
+              <a:t>C</a:t>
+            </a:r>
             <a:r>
               <a:rPr lang="en-US" sz="2400" dirty="0"/>
-              <a:t>Automated Test Cases for Step 1</a:t>
-            </a:r>
-          </a:p>
-          <a:p>
-            <a:pPr>
-              <a:buFont typeface="Wingdings" pitchFamily="2" charset="2"/>
-              <a:buChar char="q"/>
-            </a:pPr>
-            <a:r>
-              <a:rPr lang="en-US" sz="2400" dirty="0"/>
-              <a:t>Traceability Matrix for Step 2A</a:t>
-            </a:r>
-          </a:p>
-          <a:p>
-            <a:pPr>
-              <a:buFont typeface="Wingdings" pitchFamily="2" charset="2"/>
-              <a:buChar char="q"/>
-            </a:pPr>
-            <a:r>
-              <a:rPr lang="en-US" sz="2400" dirty="0"/>
-              <a:t>Licensing Analysis for Step 2B</a:t>
-            </a:r>
-          </a:p>
-          <a:p>
-            <a:pPr>
-              <a:buFont typeface="Wingdings" pitchFamily="2" charset="2"/>
-              <a:buChar char="q"/>
-            </a:pPr>
+              <a:t>:\</a:t>
+            </a:r>
             <a:r>
               <a:rPr lang="en-US" sz="2400" dirty="0" smtClean="0"/>
-              <a:t>VistA </a:t>
-            </a:r>
-            <a:r>
-              <a:rPr lang="en-US" sz="2400" dirty="0" smtClean="0"/>
-              <a:t>Enterprise Refactoring</a:t>
-            </a:r>
-          </a:p>
-          <a:p>
-            <a:pPr>
-              <a:buFont typeface="Wingdings" pitchFamily="2" charset="2"/>
-              <a:buChar char="q"/>
-            </a:pPr>
-            <a:r>
-              <a:rPr lang="en-US" sz="2400" dirty="0" smtClean="0"/>
-              <a:t>Open Mash Integration Cases</a:t>
-            </a:r>
-          </a:p>
-          <a:p>
-            <a:pPr>
-              <a:buFont typeface="Wingdings" pitchFamily="2" charset="2"/>
-              <a:buChar char="q"/>
-            </a:pPr>
-            <a:r>
-              <a:rPr lang="en-US" sz="2400" dirty="0" smtClean="0"/>
-              <a:t>Architecture Overview</a:t>
-            </a:r>
-          </a:p>
-          <a:p>
-            <a:pPr>
-              <a:buFont typeface="Wingdings" pitchFamily="2" charset="2"/>
-              <a:buChar char="q"/>
-            </a:pPr>
-            <a:r>
-              <a:rPr lang="en-US" sz="2400" dirty="0" smtClean="0"/>
-              <a:t>Document and Artifact Map</a:t>
-            </a:r>
-            <a:endParaRPr lang="en-US" sz="2400" dirty="0"/>
-          </a:p>
-          <a:p>
-            <a:pPr>
-              <a:buFont typeface="Wingdings" pitchFamily="2" charset="2"/>
-              <a:buChar char="q"/>
-            </a:pPr>
-            <a:r>
-              <a:rPr lang="en-US" sz="2400" dirty="0" smtClean="0"/>
-              <a:t>Developers </a:t>
-            </a:r>
-            <a:r>
-              <a:rPr lang="en-US" sz="2400" dirty="0" smtClean="0"/>
-              <a:t>Guide</a:t>
-            </a:r>
-          </a:p>
-          <a:p>
-            <a:pPr>
-              <a:buFont typeface="Wingdings" pitchFamily="2" charset="2"/>
-              <a:buChar char="q"/>
-            </a:pPr>
-            <a:r>
-              <a:rPr lang="en-US" sz="2400" dirty="0" smtClean="0"/>
-              <a:t>Component Documentation</a:t>
+              <a:t>Users\contestant\ContestantDocuments\openmash</a:t>
             </a:r>
           </a:p>
         </p:txBody>
       </p:sp>
       <p:sp>
         <p:nvSpPr>
-          <p:cNvPr id="4" name="Slide Number Placeholder 3"/>
+          <p:cNvPr id="4" name="Footer Placeholder 3"/>
           <p:cNvSpPr>
             <a:spLocks noGrp="1"/>
           </p:cNvSpPr>
           <p:nvPr>
-            <p:ph type="sldNum" sz="quarter" idx="10"/>
+            <p:ph type="ftr" sz="quarter" idx="10"/>
           </p:nvPr>
         </p:nvSpPr>
         <p:spPr/>
@@ -2866,13 +2876,10 @@
             <a:pPr>
               <a:defRPr/>
             </a:pPr>
-            <a:fld id="{CF6202D6-AE15-421A-8C5B-5E385A9AD0ED}" type="slidenum">
-              <a:rPr lang="fr-FR" smtClean="0"/>
-              <a:pPr>
-                <a:defRPr/>
-              </a:pPr>
-              <a:t>3</a:t>
-            </a:fld>
+            <a:r>
+              <a:rPr lang="en-US" smtClean="0"/>
+              <a:t>© Talend 2013</a:t>
+            </a:r>
             <a:endParaRPr lang="fr-FR"/>
           </a:p>
         </p:txBody>
@@ -2880,7 +2887,7 @@
     </p:spTree>
     <p:extLst>
       <p:ext uri="{BB962C8B-B14F-4D97-AF65-F5344CB8AC3E}">
-        <p14:creationId xmlns:p14="http://schemas.microsoft.com/office/powerpoint/2010/main" val="2420703082"/>
+        <p14:creationId xmlns:p14="http://schemas.microsoft.com/office/powerpoint/2010/main" val="1367252019"/>
       </p:ext>
     </p:extLst>
   </p:cSld>
@@ -2924,7 +2931,7 @@
           <a:p>
             <a:r>
               <a:rPr lang="en-US" dirty="0" smtClean="0"/>
-              <a:t>OpenMash Delivery</a:t>
+              <a:t>Deliverable Artifacts</a:t>
             </a:r>
             <a:endParaRPr lang="en-US" dirty="0"/>
           </a:p>
@@ -2945,54 +2952,162 @@
           <a:bodyPr/>
           <a:lstStyle/>
           <a:p>
-            <a:r>
-              <a:rPr lang="en-US" dirty="0"/>
-              <a:t>VistA</a:t>
-            </a:r>
-          </a:p>
-          <a:p>
-            <a:r>
-              <a:rPr lang="en-US" dirty="0" err="1" smtClean="0"/>
+            <a:pPr>
+              <a:buFont typeface="Wingdings" pitchFamily="2" charset="2"/>
+              <a:buChar char="q"/>
+            </a:pPr>
+            <a:r>
+              <a:rPr lang="en-US" sz="2400" dirty="0"/>
+              <a:t>Automated Test Cases for Step 1</a:t>
+            </a:r>
+          </a:p>
+          <a:p>
+            <a:pPr>
+              <a:buFont typeface="Wingdings" pitchFamily="2" charset="2"/>
+              <a:buChar char="q"/>
+            </a:pPr>
+            <a:r>
+              <a:rPr lang="en-US" sz="2400" dirty="0"/>
+              <a:t>Traceability Matrix for Step </a:t>
+            </a:r>
+            <a:r>
+              <a:rPr lang="en-US" sz="2400" dirty="0" smtClean="0"/>
+              <a:t>2A</a:t>
+            </a:r>
+          </a:p>
+          <a:p>
+            <a:pPr lvl="1">
+              <a:buFont typeface="Wingdings" pitchFamily="2" charset="2"/>
+              <a:buChar char="q"/>
+            </a:pPr>
+            <a:r>
+              <a:rPr lang="en-US" sz="2000" dirty="0" smtClean="0"/>
+              <a:t>Provided in Two documents</a:t>
+            </a:r>
+          </a:p>
+          <a:p>
+            <a:pPr lvl="1">
+              <a:buFont typeface="Wingdings" pitchFamily="2" charset="2"/>
+              <a:buChar char="q"/>
+            </a:pPr>
+            <a:r>
+              <a:rPr lang="en-US" sz="2000" dirty="0" err="1" smtClean="0"/>
               <a:t>MedSphere</a:t>
             </a:r>
             <a:r>
-              <a:rPr lang="en-US" dirty="0" smtClean="0"/>
-              <a:t> Scheduling Client</a:t>
-            </a:r>
-          </a:p>
-          <a:p>
-            <a:r>
-              <a:rPr lang="en-US" dirty="0" smtClean="0"/>
-              <a:t>Test Cases</a:t>
-            </a:r>
-            <a:endParaRPr lang="en-US" dirty="0"/>
-          </a:p>
-          <a:p>
-            <a:r>
-              <a:rPr lang="en-US" dirty="0" smtClean="0"/>
-              <a:t>Google Volunteer </a:t>
-            </a:r>
-            <a:r>
-              <a:rPr lang="en-US" dirty="0"/>
-              <a:t>Ride Share App</a:t>
-            </a:r>
-          </a:p>
-          <a:p>
-            <a:r>
-              <a:rPr lang="en-US" dirty="0" smtClean="0"/>
-              <a:t>Cosmo Calendar Server and UI</a:t>
-            </a:r>
-          </a:p>
-          <a:p>
-            <a:r>
-              <a:rPr lang="en-US" dirty="0" smtClean="0"/>
-              <a:t>Syncope Identity Management Integration</a:t>
-            </a:r>
-          </a:p>
-          <a:p>
-            <a:r>
-              <a:rPr lang="en-US" dirty="0" smtClean="0"/>
-              <a:t>Integration Routes and Adaptors</a:t>
+              <a:rPr lang="en-US" sz="2000" dirty="0" smtClean="0"/>
+              <a:t> coverage of requirements in Requirements </a:t>
+            </a:r>
+            <a:r>
+              <a:rPr lang="en-US" sz="2000" dirty="0" err="1" smtClean="0"/>
+              <a:t>Xref</a:t>
+            </a:r>
+            <a:r>
+              <a:rPr lang="en-US" sz="2000" dirty="0" smtClean="0"/>
+              <a:t> </a:t>
+            </a:r>
+            <a:r>
+              <a:rPr lang="en-US" sz="2000" dirty="0" err="1" smtClean="0"/>
+              <a:t>Matrix.docs</a:t>
+            </a:r>
+            <a:endParaRPr lang="en-US" sz="2000" dirty="0" smtClean="0"/>
+          </a:p>
+          <a:p>
+            <a:pPr lvl="1">
+              <a:buFont typeface="Wingdings" pitchFamily="2" charset="2"/>
+              <a:buChar char="q"/>
+            </a:pPr>
+            <a:r>
+              <a:rPr lang="en-US" sz="2000" dirty="0" smtClean="0"/>
+              <a:t>OpenMash </a:t>
+            </a:r>
+            <a:r>
+              <a:rPr lang="en-US" sz="2000" dirty="0" err="1" smtClean="0"/>
+              <a:t>xref</a:t>
+            </a:r>
+            <a:r>
+              <a:rPr lang="en-US" sz="2000" dirty="0" smtClean="0"/>
+              <a:t> in Requirements </a:t>
+            </a:r>
+            <a:r>
+              <a:rPr lang="en-US" sz="2000" dirty="0" err="1" smtClean="0"/>
+              <a:t>Xref</a:t>
+            </a:r>
+            <a:r>
+              <a:rPr lang="en-US" sz="2000" dirty="0" smtClean="0"/>
+              <a:t> Matrix.xlsx</a:t>
+            </a:r>
+            <a:endParaRPr lang="en-US" sz="2000" dirty="0"/>
+          </a:p>
+          <a:p>
+            <a:pPr>
+              <a:buFont typeface="Wingdings" pitchFamily="2" charset="2"/>
+              <a:buChar char="q"/>
+            </a:pPr>
+            <a:r>
+              <a:rPr lang="en-US" sz="2400" dirty="0"/>
+              <a:t>Licensing Analysis for Step 2B</a:t>
+            </a:r>
+          </a:p>
+          <a:p>
+            <a:pPr>
+              <a:buFont typeface="Wingdings" pitchFamily="2" charset="2"/>
+              <a:buChar char="q"/>
+            </a:pPr>
+            <a:r>
+              <a:rPr lang="en-US" sz="2400" dirty="0" smtClean="0"/>
+              <a:t>VistA Enterprise Refactoring</a:t>
+            </a:r>
+          </a:p>
+          <a:p>
+            <a:pPr>
+              <a:buFont typeface="Wingdings" pitchFamily="2" charset="2"/>
+              <a:buChar char="q"/>
+            </a:pPr>
+            <a:r>
+              <a:rPr lang="en-US" sz="2400" dirty="0" smtClean="0"/>
+              <a:t>Open Mash Integration Cases</a:t>
+            </a:r>
+          </a:p>
+          <a:p>
+            <a:pPr>
+              <a:buFont typeface="Wingdings" pitchFamily="2" charset="2"/>
+              <a:buChar char="q"/>
+            </a:pPr>
+            <a:r>
+              <a:rPr lang="en-US" sz="2400" dirty="0" smtClean="0"/>
+              <a:t>Architecture Overview</a:t>
+            </a:r>
+          </a:p>
+          <a:p>
+            <a:pPr>
+              <a:buFont typeface="Wingdings" pitchFamily="2" charset="2"/>
+              <a:buChar char="q"/>
+            </a:pPr>
+            <a:r>
+              <a:rPr lang="en-US" sz="2400" dirty="0" smtClean="0"/>
+              <a:t>Document and Artifact Map</a:t>
+            </a:r>
+            <a:endParaRPr lang="en-US" sz="2400" dirty="0"/>
+          </a:p>
+          <a:p>
+            <a:pPr>
+              <a:buFont typeface="Wingdings" pitchFamily="2" charset="2"/>
+              <a:buChar char="q"/>
+            </a:pPr>
+            <a:r>
+              <a:rPr lang="en-US" sz="2400" dirty="0" smtClean="0"/>
+              <a:t>Developers Guide</a:t>
+            </a:r>
+          </a:p>
+          <a:p>
+            <a:pPr>
+              <a:buFont typeface="Wingdings" pitchFamily="2" charset="2"/>
+              <a:buChar char="q"/>
+            </a:pPr>
+            <a:r>
+              <a:rPr lang="en-US" sz="2400" dirty="0" smtClean="0"/>
+              <a:t>Component Documentation</a:t>
             </a:r>
           </a:p>
         </p:txBody>
@@ -3021,6 +3136,155 @@
                 <a:defRPr/>
               </a:pPr>
               <a:t>4</a:t>
+            </a:fld>
+            <a:endParaRPr lang="fr-FR"/>
+          </a:p>
+        </p:txBody>
+      </p:sp>
+    </p:spTree>
+    <p:extLst>
+      <p:ext uri="{BB962C8B-B14F-4D97-AF65-F5344CB8AC3E}">
+        <p14:creationId xmlns:p14="http://schemas.microsoft.com/office/powerpoint/2010/main" val="2420703082"/>
+      </p:ext>
+    </p:extLst>
+  </p:cSld>
+  <p:clrMapOvr>
+    <a:masterClrMapping/>
+  </p:clrMapOvr>
+</p:sld>
+</file>
+
+<file path=ppt/slides/slide5.xml><?xml version="1.0" encoding="utf-8"?>
+<p:sld xmlns:a="http://schemas.openxmlformats.org/drawingml/2006/main" xmlns:r="http://schemas.openxmlformats.org/officeDocument/2006/relationships" xmlns:p="http://schemas.openxmlformats.org/presentationml/2006/main">
+  <p:cSld>
+    <p:spTree>
+      <p:nvGrpSpPr>
+        <p:cNvPr id="1" name=""/>
+        <p:cNvGrpSpPr/>
+        <p:nvPr/>
+      </p:nvGrpSpPr>
+      <p:grpSpPr>
+        <a:xfrm>
+          <a:off x="0" y="0"/>
+          <a:ext cx="0" cy="0"/>
+          <a:chOff x="0" y="0"/>
+          <a:chExt cx="0" cy="0"/>
+        </a:xfrm>
+      </p:grpSpPr>
+      <p:sp>
+        <p:nvSpPr>
+          <p:cNvPr id="2" name="Title 1"/>
+          <p:cNvSpPr>
+            <a:spLocks noGrp="1"/>
+          </p:cNvSpPr>
+          <p:nvPr>
+            <p:ph type="title"/>
+          </p:nvPr>
+        </p:nvSpPr>
+        <p:spPr/>
+        <p:txBody>
+          <a:bodyPr/>
+          <a:lstStyle/>
+          <a:p>
+            <a:r>
+              <a:rPr lang="en-US" dirty="0" smtClean="0"/>
+              <a:t>OpenMash Delivery</a:t>
+            </a:r>
+            <a:endParaRPr lang="en-US" dirty="0"/>
+          </a:p>
+        </p:txBody>
+      </p:sp>
+      <p:sp>
+        <p:nvSpPr>
+          <p:cNvPr id="3" name="Content Placeholder 2"/>
+          <p:cNvSpPr>
+            <a:spLocks noGrp="1"/>
+          </p:cNvSpPr>
+          <p:nvPr>
+            <p:ph idx="1"/>
+          </p:nvPr>
+        </p:nvSpPr>
+        <p:spPr/>
+        <p:txBody>
+          <a:bodyPr/>
+          <a:lstStyle/>
+          <a:p>
+            <a:r>
+              <a:rPr lang="en-US" dirty="0"/>
+              <a:t>VistA</a:t>
+            </a:r>
+          </a:p>
+          <a:p>
+            <a:r>
+              <a:rPr lang="en-US" dirty="0" err="1" smtClean="0"/>
+              <a:t>MedSphere</a:t>
+            </a:r>
+            <a:r>
+              <a:rPr lang="en-US" dirty="0" smtClean="0"/>
+              <a:t> Scheduling Client</a:t>
+            </a:r>
+          </a:p>
+          <a:p>
+            <a:r>
+              <a:rPr lang="en-US" dirty="0" smtClean="0"/>
+              <a:t>Test Cases</a:t>
+            </a:r>
+            <a:endParaRPr lang="en-US" dirty="0"/>
+          </a:p>
+          <a:p>
+            <a:r>
+              <a:rPr lang="en-US" dirty="0" smtClean="0"/>
+              <a:t>Google Volunteer </a:t>
+            </a:r>
+            <a:r>
+              <a:rPr lang="en-US" dirty="0"/>
+              <a:t>Ride Share App</a:t>
+            </a:r>
+          </a:p>
+          <a:p>
+            <a:r>
+              <a:rPr lang="en-US" dirty="0" smtClean="0"/>
+              <a:t>Cosmo Calendar Server and UI</a:t>
+            </a:r>
+          </a:p>
+          <a:p>
+            <a:r>
+              <a:rPr lang="en-US" dirty="0" smtClean="0"/>
+              <a:t>Syncope Identity Management Integration</a:t>
+            </a:r>
+          </a:p>
+          <a:p>
+            <a:r>
+              <a:rPr lang="en-US" dirty="0" smtClean="0"/>
+              <a:t>Integration Routes and Adaptors</a:t>
+            </a:r>
+          </a:p>
+        </p:txBody>
+      </p:sp>
+      <p:sp>
+        <p:nvSpPr>
+          <p:cNvPr id="4" name="Slide Number Placeholder 3"/>
+          <p:cNvSpPr>
+            <a:spLocks noGrp="1"/>
+          </p:cNvSpPr>
+          <p:nvPr>
+            <p:ph type="sldNum" sz="quarter" idx="10"/>
+          </p:nvPr>
+        </p:nvSpPr>
+        <p:spPr/>
+        <p:txBody>
+          <a:bodyPr/>
+          <a:lstStyle/>
+          <a:p>
+            <a:pPr>
+              <a:defRPr/>
+            </a:pPr>
+            <a:fld id="{CF6202D6-AE15-421A-8C5B-5E385A9AD0ED}" type="slidenum">
+              <a:rPr lang="fr-FR" smtClean="0"/>
+              <a:pPr>
+                <a:defRPr/>
+              </a:pPr>
+              <a:t>5</a:t>
             </a:fld>
             <a:endParaRPr lang="fr-FR"/>
           </a:p>

</xml_diff>